<commit_message>
changes to presentation - Business Opportunity
</commit_message>
<xml_diff>
--- a/Return_on_Renovation_Pres.pptx
+++ b/Return_on_Renovation_Pres.pptx
@@ -5,19 +5,20 @@
     <p:sldMasterId id="2147483648" r:id="rId1"/>
   </p:sldMasterIdLst>
   <p:notesMasterIdLst>
-    <p:notesMasterId r:id="rId12"/>
+    <p:notesMasterId r:id="rId13"/>
   </p:notesMasterIdLst>
   <p:sldIdLst>
     <p:sldId id="256" r:id="rId2"/>
     <p:sldId id="257" r:id="rId3"/>
     <p:sldId id="258" r:id="rId4"/>
-    <p:sldId id="259" r:id="rId5"/>
-    <p:sldId id="268" r:id="rId6"/>
-    <p:sldId id="266" r:id="rId7"/>
-    <p:sldId id="262" r:id="rId8"/>
-    <p:sldId id="265" r:id="rId9"/>
-    <p:sldId id="263" r:id="rId10"/>
-    <p:sldId id="267" r:id="rId11"/>
+    <p:sldId id="269" r:id="rId5"/>
+    <p:sldId id="259" r:id="rId6"/>
+    <p:sldId id="268" r:id="rId7"/>
+    <p:sldId id="266" r:id="rId8"/>
+    <p:sldId id="262" r:id="rId9"/>
+    <p:sldId id="265" r:id="rId10"/>
+    <p:sldId id="263" r:id="rId11"/>
+    <p:sldId id="267" r:id="rId12"/>
   </p:sldIdLst>
   <p:sldSz cx="12192000" cy="6858000"/>
   <p:notesSz cx="6858000" cy="9144000"/>
@@ -8887,7 +8888,7 @@
           <a:p>
             <a:fld id="{EC98414C-9501-204B-AA89-DD9E19923D69}" type="datetimeFigureOut">
               <a:rPr lang="en-US" smtClean="0"/>
-              <a:t>3/1/22</a:t>
+              <a:t>3/2/22</a:t>
             </a:fld>
             <a:endParaRPr lang="en-US"/>
           </a:p>
@@ -9385,7 +9386,7 @@
           <a:p>
             <a:fld id="{87AE6D6B-FC98-C443-AD11-92EB31378F15}" type="datetimeFigureOut">
               <a:rPr lang="en-US" smtClean="0"/>
-              <a:t>3/1/22</a:t>
+              <a:t>3/2/22</a:t>
             </a:fld>
             <a:endParaRPr lang="en-US"/>
           </a:p>
@@ -9583,7 +9584,7 @@
           <a:p>
             <a:fld id="{87AE6D6B-FC98-C443-AD11-92EB31378F15}" type="datetimeFigureOut">
               <a:rPr lang="en-US" smtClean="0"/>
-              <a:t>3/1/22</a:t>
+              <a:t>3/2/22</a:t>
             </a:fld>
             <a:endParaRPr lang="en-US"/>
           </a:p>
@@ -9791,7 +9792,7 @@
           <a:p>
             <a:fld id="{87AE6D6B-FC98-C443-AD11-92EB31378F15}" type="datetimeFigureOut">
               <a:rPr lang="en-US" smtClean="0"/>
-              <a:t>3/1/22</a:t>
+              <a:t>3/2/22</a:t>
             </a:fld>
             <a:endParaRPr lang="en-US"/>
           </a:p>
@@ -9989,7 +9990,7 @@
           <a:p>
             <a:fld id="{87AE6D6B-FC98-C443-AD11-92EB31378F15}" type="datetimeFigureOut">
               <a:rPr lang="en-US" smtClean="0"/>
-              <a:t>3/1/22</a:t>
+              <a:t>3/2/22</a:t>
             </a:fld>
             <a:endParaRPr lang="en-US"/>
           </a:p>
@@ -10264,7 +10265,7 @@
           <a:p>
             <a:fld id="{87AE6D6B-FC98-C443-AD11-92EB31378F15}" type="datetimeFigureOut">
               <a:rPr lang="en-US" smtClean="0"/>
-              <a:t>3/1/22</a:t>
+              <a:t>3/2/22</a:t>
             </a:fld>
             <a:endParaRPr lang="en-US"/>
           </a:p>
@@ -10529,7 +10530,7 @@
           <a:p>
             <a:fld id="{87AE6D6B-FC98-C443-AD11-92EB31378F15}" type="datetimeFigureOut">
               <a:rPr lang="en-US" smtClean="0"/>
-              <a:t>3/1/22</a:t>
+              <a:t>3/2/22</a:t>
             </a:fld>
             <a:endParaRPr lang="en-US"/>
           </a:p>
@@ -10941,7 +10942,7 @@
           <a:p>
             <a:fld id="{87AE6D6B-FC98-C443-AD11-92EB31378F15}" type="datetimeFigureOut">
               <a:rPr lang="en-US" smtClean="0"/>
-              <a:t>3/1/22</a:t>
+              <a:t>3/2/22</a:t>
             </a:fld>
             <a:endParaRPr lang="en-US"/>
           </a:p>
@@ -11082,7 +11083,7 @@
           <a:p>
             <a:fld id="{87AE6D6B-FC98-C443-AD11-92EB31378F15}" type="datetimeFigureOut">
               <a:rPr lang="en-US" smtClean="0"/>
-              <a:t>3/1/22</a:t>
+              <a:t>3/2/22</a:t>
             </a:fld>
             <a:endParaRPr lang="en-US"/>
           </a:p>
@@ -11195,7 +11196,7 @@
           <a:p>
             <a:fld id="{87AE6D6B-FC98-C443-AD11-92EB31378F15}" type="datetimeFigureOut">
               <a:rPr lang="en-US" smtClean="0"/>
-              <a:t>3/1/22</a:t>
+              <a:t>3/2/22</a:t>
             </a:fld>
             <a:endParaRPr lang="en-US"/>
           </a:p>
@@ -11506,7 +11507,7 @@
           <a:p>
             <a:fld id="{87AE6D6B-FC98-C443-AD11-92EB31378F15}" type="datetimeFigureOut">
               <a:rPr lang="en-US" smtClean="0"/>
-              <a:t>3/1/22</a:t>
+              <a:t>3/2/22</a:t>
             </a:fld>
             <a:endParaRPr lang="en-US"/>
           </a:p>
@@ -11794,7 +11795,7 @@
           <a:p>
             <a:fld id="{87AE6D6B-FC98-C443-AD11-92EB31378F15}" type="datetimeFigureOut">
               <a:rPr lang="en-US" smtClean="0"/>
-              <a:t>3/1/22</a:t>
+              <a:t>3/2/22</a:t>
             </a:fld>
             <a:endParaRPr lang="en-US"/>
           </a:p>
@@ -12035,7 +12036,7 @@
           <a:p>
             <a:fld id="{87AE6D6B-FC98-C443-AD11-92EB31378F15}" type="datetimeFigureOut">
               <a:rPr lang="en-US" smtClean="0"/>
-              <a:t>3/1/22</a:t>
+              <a:t>3/2/22</a:t>
             </a:fld>
             <a:endParaRPr lang="en-US"/>
           </a:p>
@@ -13071,6 +13072,153 @@
           <p:cNvPr id="2" name="Title 1">
             <a:extLst>
               <a:ext uri="{FF2B5EF4-FFF2-40B4-BE49-F238E27FC236}">
+                <a16:creationId xmlns:a16="http://schemas.microsoft.com/office/drawing/2014/main" id="{0B893CDD-E415-0640-85B6-41781BC8139A}"/>
+              </a:ext>
+            </a:extLst>
+          </p:cNvPr>
+          <p:cNvSpPr>
+            <a:spLocks noGrp="1"/>
+          </p:cNvSpPr>
+          <p:nvPr>
+            <p:ph type="title"/>
+          </p:nvPr>
+        </p:nvSpPr>
+        <p:spPr/>
+        <p:txBody>
+          <a:bodyPr/>
+          <a:lstStyle/>
+          <a:p>
+            <a:r>
+              <a:rPr lang="en-US" dirty="0"/>
+              <a:t>Conclusions</a:t>
+            </a:r>
+          </a:p>
+        </p:txBody>
+      </p:sp>
+      <p:sp>
+        <p:nvSpPr>
+          <p:cNvPr id="3" name="Content Placeholder 2">
+            <a:extLst>
+              <a:ext uri="{FF2B5EF4-FFF2-40B4-BE49-F238E27FC236}">
+                <a16:creationId xmlns:a16="http://schemas.microsoft.com/office/drawing/2014/main" id="{5B01F720-109A-5242-A377-833303CAD447}"/>
+              </a:ext>
+            </a:extLst>
+          </p:cNvPr>
+          <p:cNvSpPr>
+            <a:spLocks noGrp="1"/>
+          </p:cNvSpPr>
+          <p:nvPr>
+            <p:ph idx="1"/>
+          </p:nvPr>
+        </p:nvSpPr>
+        <p:spPr/>
+        <p:txBody>
+          <a:bodyPr>
+            <a:normAutofit lnSpcReduction="10000"/>
+          </a:bodyPr>
+          <a:lstStyle/>
+          <a:p>
+            <a:r>
+              <a:rPr lang="en-US" dirty="0"/>
+              <a:t>There are excellent opportunities to increase home price for home-owners planning to renovate their property.</a:t>
+            </a:r>
+          </a:p>
+          <a:p>
+            <a:pPr marL="0" indent="0">
+              <a:buNone/>
+            </a:pPr>
+            <a:endParaRPr lang="en-US" dirty="0"/>
+          </a:p>
+          <a:p>
+            <a:r>
+              <a:rPr lang="en-US" dirty="0"/>
+              <a:t>Top priorities to increase price:</a:t>
+            </a:r>
+          </a:p>
+          <a:p>
+            <a:pPr lvl="1"/>
+            <a:r>
+              <a:rPr lang="en-US" dirty="0"/>
+              <a:t>Improve condition of home – update to modern fixtures and appliances</a:t>
+            </a:r>
+          </a:p>
+          <a:p>
+            <a:pPr lvl="1"/>
+            <a:r>
+              <a:rPr lang="en-US" dirty="0"/>
+              <a:t>Improve grade of home – structural renovation and improved craftsmanship</a:t>
+            </a:r>
+          </a:p>
+          <a:p>
+            <a:pPr lvl="1"/>
+            <a:r>
+              <a:rPr lang="en-US" dirty="0"/>
+              <a:t>Add livable square footage – convert garage, build guest house, expand</a:t>
+            </a:r>
+          </a:p>
+          <a:p>
+            <a:pPr marL="457200" lvl="1" indent="0">
+              <a:buNone/>
+            </a:pPr>
+            <a:endParaRPr lang="en-US" dirty="0"/>
+          </a:p>
+          <a:p>
+            <a:r>
+              <a:rPr lang="en-US" dirty="0"/>
+              <a:t>Other options exist -</a:t>
+            </a:r>
+          </a:p>
+          <a:p>
+            <a:pPr lvl="1"/>
+            <a:r>
+              <a:rPr lang="en-US" dirty="0"/>
+              <a:t>Improving or adding a view – rooftop deck, patio, bigger window, landscaping</a:t>
+            </a:r>
+          </a:p>
+          <a:p>
+            <a:pPr lvl="1"/>
+            <a:r>
+              <a:rPr lang="en-US" dirty="0"/>
+              <a:t>Add a Floor or Bathroom – more livable space increases price</a:t>
+            </a:r>
+          </a:p>
+        </p:txBody>
+      </p:sp>
+    </p:spTree>
+    <p:extLst>
+      <p:ext uri="{BB962C8B-B14F-4D97-AF65-F5344CB8AC3E}">
+        <p14:creationId xmlns:p14="http://schemas.microsoft.com/office/powerpoint/2010/main" val="2874319008"/>
+      </p:ext>
+    </p:extLst>
+  </p:cSld>
+  <p:clrMapOvr>
+    <a:masterClrMapping/>
+  </p:clrMapOvr>
+</p:sld>
+</file>
+
+<file path=ppt/slides/slide11.xml><?xml version="1.0" encoding="utf-8"?>
+<p:sld xmlns:a="http://schemas.openxmlformats.org/drawingml/2006/main" xmlns:r="http://schemas.openxmlformats.org/officeDocument/2006/relationships" xmlns:p="http://schemas.openxmlformats.org/presentationml/2006/main">
+  <p:cSld>
+    <p:spTree>
+      <p:nvGrpSpPr>
+        <p:cNvPr id="1" name=""/>
+        <p:cNvGrpSpPr/>
+        <p:nvPr/>
+      </p:nvGrpSpPr>
+      <p:grpSpPr>
+        <a:xfrm>
+          <a:off x="0" y="0"/>
+          <a:ext cx="0" cy="0"/>
+          <a:chOff x="0" y="0"/>
+          <a:chExt cx="0" cy="0"/>
+        </a:xfrm>
+      </p:grpSpPr>
+      <p:sp>
+        <p:nvSpPr>
+          <p:cNvPr id="2" name="Title 1">
+            <a:extLst>
+              <a:ext uri="{FF2B5EF4-FFF2-40B4-BE49-F238E27FC236}">
                 <a16:creationId xmlns:a16="http://schemas.microsoft.com/office/drawing/2014/main" id="{0CC1E992-8AD6-0C40-9956-F47ACAEF40DA}"/>
               </a:ext>
             </a:extLst>
@@ -13585,6 +13733,149 @@
 <file path=ppt/slides/slide4.xml><?xml version="1.0" encoding="utf-8"?>
 <p:sld xmlns:a="http://schemas.openxmlformats.org/drawingml/2006/main" xmlns:r="http://schemas.openxmlformats.org/officeDocument/2006/relationships" xmlns:p="http://schemas.openxmlformats.org/presentationml/2006/main">
   <p:cSld>
+    <p:spTree>
+      <p:nvGrpSpPr>
+        <p:cNvPr id="1" name=""/>
+        <p:cNvGrpSpPr/>
+        <p:nvPr/>
+      </p:nvGrpSpPr>
+      <p:grpSpPr>
+        <a:xfrm>
+          <a:off x="0" y="0"/>
+          <a:ext cx="0" cy="0"/>
+          <a:chOff x="0" y="0"/>
+          <a:chExt cx="0" cy="0"/>
+        </a:xfrm>
+      </p:grpSpPr>
+      <p:sp>
+        <p:nvSpPr>
+          <p:cNvPr id="2" name="Title 1">
+            <a:extLst>
+              <a:ext uri="{FF2B5EF4-FFF2-40B4-BE49-F238E27FC236}">
+                <a16:creationId xmlns:a16="http://schemas.microsoft.com/office/drawing/2014/main" id="{6EBFC826-18A1-3340-92C6-F1D2A207F34D}"/>
+              </a:ext>
+            </a:extLst>
+          </p:cNvPr>
+          <p:cNvSpPr>
+            <a:spLocks noGrp="1"/>
+          </p:cNvSpPr>
+          <p:nvPr>
+            <p:ph type="title"/>
+          </p:nvPr>
+        </p:nvSpPr>
+        <p:spPr/>
+        <p:txBody>
+          <a:bodyPr/>
+          <a:lstStyle/>
+          <a:p>
+            <a:r>
+              <a:rPr lang="en-US" dirty="0"/>
+              <a:t>Business Opportunity</a:t>
+            </a:r>
+          </a:p>
+        </p:txBody>
+      </p:sp>
+      <p:sp>
+        <p:nvSpPr>
+          <p:cNvPr id="3" name="Content Placeholder 2">
+            <a:extLst>
+              <a:ext uri="{FF2B5EF4-FFF2-40B4-BE49-F238E27FC236}">
+                <a16:creationId xmlns:a16="http://schemas.microsoft.com/office/drawing/2014/main" id="{8FCC37E3-CD66-5C4F-A965-D37ECB2BD875}"/>
+              </a:ext>
+            </a:extLst>
+          </p:cNvPr>
+          <p:cNvSpPr>
+            <a:spLocks noGrp="1"/>
+          </p:cNvSpPr>
+          <p:nvPr>
+            <p:ph idx="1"/>
+          </p:nvPr>
+        </p:nvSpPr>
+        <p:spPr/>
+        <p:txBody>
+          <a:bodyPr/>
+          <a:lstStyle/>
+          <a:p>
+            <a:pPr>
+              <a:spcAft>
+                <a:spcPts val="600"/>
+              </a:spcAft>
+            </a:pPr>
+            <a:r>
+              <a:rPr lang="en-US" dirty="0"/>
+              <a:t>Build app within real-estate tech company</a:t>
+            </a:r>
+          </a:p>
+          <a:p>
+            <a:pPr lvl="1">
+              <a:spcAft>
+                <a:spcPts val="600"/>
+              </a:spcAft>
+            </a:pPr>
+            <a:r>
+              <a:rPr lang="en-US" dirty="0"/>
+              <a:t>Zillow, Redfin, </a:t>
+            </a:r>
+            <a:r>
+              <a:rPr lang="en-US" dirty="0" err="1"/>
+              <a:t>Opendoor</a:t>
+            </a:r>
+            <a:r>
+              <a:rPr lang="en-US" dirty="0"/>
+              <a:t>, Flip, etc.</a:t>
+            </a:r>
+          </a:p>
+          <a:p>
+            <a:pPr>
+              <a:spcAft>
+                <a:spcPts val="600"/>
+              </a:spcAft>
+            </a:pPr>
+            <a:r>
+              <a:rPr lang="en-US" dirty="0"/>
+              <a:t>Users visit to learn how renovations will increase their home price</a:t>
+            </a:r>
+          </a:p>
+          <a:p>
+            <a:pPr>
+              <a:spcAft>
+                <a:spcPts val="600"/>
+              </a:spcAft>
+            </a:pPr>
+            <a:r>
+              <a:rPr lang="en-US" dirty="0"/>
+              <a:t>Increases revenue via product suite</a:t>
+            </a:r>
+          </a:p>
+          <a:p>
+            <a:pPr lvl="1">
+              <a:spcAft>
+                <a:spcPts val="600"/>
+              </a:spcAft>
+            </a:pPr>
+            <a:r>
+              <a:rPr lang="en-US" dirty="0"/>
+              <a:t>Funnel more users to platform</a:t>
+            </a:r>
+          </a:p>
+        </p:txBody>
+      </p:sp>
+    </p:spTree>
+    <p:extLst>
+      <p:ext uri="{BB962C8B-B14F-4D97-AF65-F5344CB8AC3E}">
+        <p14:creationId xmlns:p14="http://schemas.microsoft.com/office/powerpoint/2010/main" val="963744748"/>
+      </p:ext>
+    </p:extLst>
+  </p:cSld>
+  <p:clrMapOvr>
+    <a:masterClrMapping/>
+  </p:clrMapOvr>
+</p:sld>
+</file>
+
+<file path=ppt/slides/slide5.xml><?xml version="1.0" encoding="utf-8"?>
+<p:sld xmlns:a="http://schemas.openxmlformats.org/drawingml/2006/main" xmlns:r="http://schemas.openxmlformats.org/officeDocument/2006/relationships" xmlns:p="http://schemas.openxmlformats.org/presentationml/2006/main">
+  <p:cSld>
     <p:bg>
       <p:bgPr>
         <a:solidFill>
@@ -13883,7 +14174,7 @@
 </p:sld>
 </file>
 
-<file path=ppt/slides/slide5.xml><?xml version="1.0" encoding="utf-8"?>
+<file path=ppt/slides/slide6.xml><?xml version="1.0" encoding="utf-8"?>
 <p:sld xmlns:a="http://schemas.openxmlformats.org/drawingml/2006/main" xmlns:r="http://schemas.openxmlformats.org/officeDocument/2006/relationships" xmlns:p="http://schemas.openxmlformats.org/presentationml/2006/main">
   <p:cSld>
     <p:spTree>
@@ -13979,7 +14270,7 @@
 </p:sld>
 </file>
 
-<file path=ppt/slides/slide6.xml><?xml version="1.0" encoding="utf-8"?>
+<file path=ppt/slides/slide7.xml><?xml version="1.0" encoding="utf-8"?>
 <p:sld xmlns:a="http://schemas.openxmlformats.org/drawingml/2006/main" xmlns:r="http://schemas.openxmlformats.org/officeDocument/2006/relationships" xmlns:p="http://schemas.openxmlformats.org/presentationml/2006/main">
   <p:cSld>
     <p:bg>
@@ -14232,7 +14523,7 @@
 </p:sld>
 </file>
 
-<file path=ppt/slides/slide7.xml><?xml version="1.0" encoding="utf-8"?>
+<file path=ppt/slides/slide8.xml><?xml version="1.0" encoding="utf-8"?>
 <p:sld xmlns:a="http://schemas.openxmlformats.org/drawingml/2006/main" xmlns:r="http://schemas.openxmlformats.org/officeDocument/2006/relationships" xmlns:p="http://schemas.openxmlformats.org/presentationml/2006/main">
   <p:cSld>
     <p:bg>
@@ -14559,7 +14850,7 @@
 </p:sld>
 </file>
 
-<file path=ppt/slides/slide8.xml><?xml version="1.0" encoding="utf-8"?>
+<file path=ppt/slides/slide9.xml><?xml version="1.0" encoding="utf-8"?>
 <p:sld xmlns:a="http://schemas.openxmlformats.org/drawingml/2006/main" xmlns:r="http://schemas.openxmlformats.org/officeDocument/2006/relationships" xmlns:p="http://schemas.openxmlformats.org/presentationml/2006/main">
   <p:cSld>
     <p:bg>
@@ -14862,153 +15153,6 @@
     <p:extLst>
       <p:ext uri="{BB962C8B-B14F-4D97-AF65-F5344CB8AC3E}">
         <p14:creationId xmlns:p14="http://schemas.microsoft.com/office/powerpoint/2010/main" val="973790724"/>
-      </p:ext>
-    </p:extLst>
-  </p:cSld>
-  <p:clrMapOvr>
-    <a:masterClrMapping/>
-  </p:clrMapOvr>
-</p:sld>
-</file>
-
-<file path=ppt/slides/slide9.xml><?xml version="1.0" encoding="utf-8"?>
-<p:sld xmlns:a="http://schemas.openxmlformats.org/drawingml/2006/main" xmlns:r="http://schemas.openxmlformats.org/officeDocument/2006/relationships" xmlns:p="http://schemas.openxmlformats.org/presentationml/2006/main">
-  <p:cSld>
-    <p:spTree>
-      <p:nvGrpSpPr>
-        <p:cNvPr id="1" name=""/>
-        <p:cNvGrpSpPr/>
-        <p:nvPr/>
-      </p:nvGrpSpPr>
-      <p:grpSpPr>
-        <a:xfrm>
-          <a:off x="0" y="0"/>
-          <a:ext cx="0" cy="0"/>
-          <a:chOff x="0" y="0"/>
-          <a:chExt cx="0" cy="0"/>
-        </a:xfrm>
-      </p:grpSpPr>
-      <p:sp>
-        <p:nvSpPr>
-          <p:cNvPr id="2" name="Title 1">
-            <a:extLst>
-              <a:ext uri="{FF2B5EF4-FFF2-40B4-BE49-F238E27FC236}">
-                <a16:creationId xmlns:a16="http://schemas.microsoft.com/office/drawing/2014/main" id="{0B893CDD-E415-0640-85B6-41781BC8139A}"/>
-              </a:ext>
-            </a:extLst>
-          </p:cNvPr>
-          <p:cNvSpPr>
-            <a:spLocks noGrp="1"/>
-          </p:cNvSpPr>
-          <p:nvPr>
-            <p:ph type="title"/>
-          </p:nvPr>
-        </p:nvSpPr>
-        <p:spPr/>
-        <p:txBody>
-          <a:bodyPr/>
-          <a:lstStyle/>
-          <a:p>
-            <a:r>
-              <a:rPr lang="en-US" dirty="0"/>
-              <a:t>Conclusions</a:t>
-            </a:r>
-          </a:p>
-        </p:txBody>
-      </p:sp>
-      <p:sp>
-        <p:nvSpPr>
-          <p:cNvPr id="3" name="Content Placeholder 2">
-            <a:extLst>
-              <a:ext uri="{FF2B5EF4-FFF2-40B4-BE49-F238E27FC236}">
-                <a16:creationId xmlns:a16="http://schemas.microsoft.com/office/drawing/2014/main" id="{5B01F720-109A-5242-A377-833303CAD447}"/>
-              </a:ext>
-            </a:extLst>
-          </p:cNvPr>
-          <p:cNvSpPr>
-            <a:spLocks noGrp="1"/>
-          </p:cNvSpPr>
-          <p:nvPr>
-            <p:ph idx="1"/>
-          </p:nvPr>
-        </p:nvSpPr>
-        <p:spPr/>
-        <p:txBody>
-          <a:bodyPr>
-            <a:normAutofit lnSpcReduction="10000"/>
-          </a:bodyPr>
-          <a:lstStyle/>
-          <a:p>
-            <a:r>
-              <a:rPr lang="en-US" dirty="0"/>
-              <a:t>There are excellent opportunities to increase home price for home-owners planning to renovate their property.</a:t>
-            </a:r>
-          </a:p>
-          <a:p>
-            <a:pPr marL="0" indent="0">
-              <a:buNone/>
-            </a:pPr>
-            <a:endParaRPr lang="en-US" dirty="0"/>
-          </a:p>
-          <a:p>
-            <a:r>
-              <a:rPr lang="en-US" dirty="0"/>
-              <a:t>Top priorities to increase price:</a:t>
-            </a:r>
-          </a:p>
-          <a:p>
-            <a:pPr lvl="1"/>
-            <a:r>
-              <a:rPr lang="en-US" dirty="0"/>
-              <a:t>Improve condition of home – update to modern fixtures and appliances</a:t>
-            </a:r>
-          </a:p>
-          <a:p>
-            <a:pPr lvl="1"/>
-            <a:r>
-              <a:rPr lang="en-US" dirty="0"/>
-              <a:t>Improve grade of home – structural renovation and improved craftsmanship</a:t>
-            </a:r>
-          </a:p>
-          <a:p>
-            <a:pPr lvl="1"/>
-            <a:r>
-              <a:rPr lang="en-US" dirty="0"/>
-              <a:t>Add livable square footage – convert garage, build guest house, expand</a:t>
-            </a:r>
-          </a:p>
-          <a:p>
-            <a:pPr marL="457200" lvl="1" indent="0">
-              <a:buNone/>
-            </a:pPr>
-            <a:endParaRPr lang="en-US" dirty="0"/>
-          </a:p>
-          <a:p>
-            <a:r>
-              <a:rPr lang="en-US" dirty="0"/>
-              <a:t>Other options exist -</a:t>
-            </a:r>
-          </a:p>
-          <a:p>
-            <a:pPr lvl="1"/>
-            <a:r>
-              <a:rPr lang="en-US" dirty="0"/>
-              <a:t>Improving or adding a view – rooftop deck, patio, bigger window, landscaping</a:t>
-            </a:r>
-          </a:p>
-          <a:p>
-            <a:pPr lvl="1"/>
-            <a:r>
-              <a:rPr lang="en-US" dirty="0"/>
-              <a:t>Add a Floor or Bathroom – more livable space increases price</a:t>
-            </a:r>
-          </a:p>
-        </p:txBody>
-      </p:sp>
-    </p:spTree>
-    <p:extLst>
-      <p:ext uri="{BB962C8B-B14F-4D97-AF65-F5344CB8AC3E}">
-        <p14:creationId xmlns:p14="http://schemas.microsoft.com/office/powerpoint/2010/main" val="2874319008"/>
       </p:ext>
     </p:extLst>
   </p:cSld>

</xml_diff>

<commit_message>
improved layout - Bus. Opp
</commit_message>
<xml_diff>
--- a/Return_on_Renovation_Pres.pptx
+++ b/Return_on_Renovation_Pres.pptx
@@ -13733,6 +13733,14 @@
 <file path=ppt/slides/slide4.xml><?xml version="1.0" encoding="utf-8"?>
 <p:sld xmlns:a="http://schemas.openxmlformats.org/drawingml/2006/main" xmlns:r="http://schemas.openxmlformats.org/officeDocument/2006/relationships" xmlns:p="http://schemas.openxmlformats.org/presentationml/2006/main">
   <p:cSld>
+    <p:bg>
+      <p:bgPr>
+        <a:solidFill>
+          <a:schemeClr val="bg1"/>
+        </a:solidFill>
+        <a:effectLst/>
+      </p:bgPr>
+    </p:bg>
     <p:spTree>
       <p:nvGrpSpPr>
         <p:cNvPr id="1" name=""/>
@@ -13763,13 +13771,20 @@
             <p:ph type="title"/>
           </p:nvPr>
         </p:nvSpPr>
-        <p:spPr/>
+        <p:spPr>
+          <a:xfrm>
+            <a:off x="4965430" y="629268"/>
+            <a:ext cx="6586491" cy="1286160"/>
+          </a:xfrm>
+        </p:spPr>
         <p:txBody>
-          <a:bodyPr/>
+          <a:bodyPr anchor="b">
+            <a:normAutofit/>
+          </a:bodyPr>
           <a:lstStyle/>
           <a:p>
             <a:r>
-              <a:rPr lang="en-US" dirty="0"/>
+              <a:rPr lang="en-US" b="1" dirty="0"/>
               <a:t>Business Opportunity</a:t>
             </a:r>
           </a:p>
@@ -13791,9 +13806,16 @@
             <p:ph idx="1"/>
           </p:nvPr>
         </p:nvSpPr>
-        <p:spPr/>
+        <p:spPr>
+          <a:xfrm>
+            <a:off x="4965431" y="2438400"/>
+            <a:ext cx="6586489" cy="3785419"/>
+          </a:xfrm>
+        </p:spPr>
         <p:txBody>
-          <a:bodyPr/>
+          <a:bodyPr>
+            <a:normAutofit/>
+          </a:bodyPr>
           <a:lstStyle/>
           <a:p>
             <a:pPr>
@@ -13813,15 +13835,15 @@
               </a:spcAft>
             </a:pPr>
             <a:r>
-              <a:rPr lang="en-US" dirty="0"/>
+              <a:rPr lang="en-US" sz="2800" dirty="0"/>
               <a:t>Zillow, Redfin, </a:t>
             </a:r>
             <a:r>
-              <a:rPr lang="en-US" dirty="0" err="1"/>
+              <a:rPr lang="en-US" sz="2800" dirty="0" err="1"/>
               <a:t>Opendoor</a:t>
             </a:r>
             <a:r>
-              <a:rPr lang="en-US" dirty="0"/>
+              <a:rPr lang="en-US" sz="2800" dirty="0"/>
               <a:t>, Flip, etc.</a:t>
             </a:r>
           </a:p>
@@ -13854,12 +13876,94 @@
               </a:spcAft>
             </a:pPr>
             <a:r>
-              <a:rPr lang="en-US" dirty="0"/>
+              <a:rPr lang="en-US" sz="2800" dirty="0"/>
               <a:t>Funnel more users to platform</a:t>
             </a:r>
           </a:p>
         </p:txBody>
       </p:sp>
+      <p:pic>
+        <p:nvPicPr>
+          <p:cNvPr id="5" name="Picture 4">
+            <a:extLst>
+              <a:ext uri="{FF2B5EF4-FFF2-40B4-BE49-F238E27FC236}">
+                <a16:creationId xmlns:a16="http://schemas.microsoft.com/office/drawing/2014/main" id="{74E8D0BC-CBA4-4002-8407-7610AB0892E4}"/>
+              </a:ext>
+            </a:extLst>
+          </p:cNvPr>
+          <p:cNvPicPr>
+            <a:picLocks noChangeAspect="1"/>
+          </p:cNvPicPr>
+          <p:nvPr/>
+        </p:nvPicPr>
+        <p:blipFill rotWithShape="1">
+          <a:blip r:embed="rId2"/>
+          <a:srcRect l="24792" r="30258"/>
+          <a:stretch/>
+        </p:blipFill>
+        <p:spPr>
+          <a:xfrm>
+            <a:off x="20" y="10"/>
+            <a:ext cx="4635571" cy="6857990"/>
+          </a:xfrm>
+          <a:prstGeom prst="rect">
+            <a:avLst/>
+          </a:prstGeom>
+          <a:effectLst/>
+        </p:spPr>
+      </p:pic>
+      <p:cxnSp>
+        <p:nvCxnSpPr>
+          <p:cNvPr id="9" name="Straight Connector 8">
+            <a:extLst>
+              <a:ext uri="{FF2B5EF4-FFF2-40B4-BE49-F238E27FC236}">
+                <a16:creationId xmlns:a16="http://schemas.microsoft.com/office/drawing/2014/main" id="{A7F400EE-A8A5-48AF-B4D6-291B52C6F0B0}"/>
+              </a:ext>
+              <a:ext uri="{C183D7F6-B498-43B3-948B-1728B52AA6E4}">
+                <adec:decorative xmlns:adec="http://schemas.microsoft.com/office/drawing/2017/decorative" val="1"/>
+              </a:ext>
+            </a:extLst>
+          </p:cNvPr>
+          <p:cNvCxnSpPr>
+            <a:cxnSpLocks noGrp="1" noRot="1" noChangeAspect="1" noMove="1" noResize="1" noEditPoints="1" noAdjustHandles="1" noChangeArrowheads="1" noChangeShapeType="1"/>
+          </p:cNvCxnSpPr>
+          <p:nvPr>
+            <p:extLst>
+              <p:ext uri="{386F3935-93C4-4BCD-93E2-E3B085C9AB24}">
+                <p16:designElem xmlns:p16="http://schemas.microsoft.com/office/powerpoint/2015/main" val="1"/>
+              </p:ext>
+            </p:extLst>
+          </p:nvPr>
+        </p:nvCxnSpPr>
+        <p:spPr>
+          <a:xfrm>
+            <a:off x="5080934" y="2115117"/>
+            <a:ext cx="6309360" cy="0"/>
+          </a:xfrm>
+          <a:prstGeom prst="line">
+            <a:avLst/>
+          </a:prstGeom>
+          <a:ln w="19050">
+            <a:solidFill>
+              <a:srgbClr val="E64380"/>
+            </a:solidFill>
+          </a:ln>
+        </p:spPr>
+        <p:style>
+          <a:lnRef idx="1">
+            <a:schemeClr val="accent1"/>
+          </a:lnRef>
+          <a:fillRef idx="0">
+            <a:schemeClr val="accent1"/>
+          </a:fillRef>
+          <a:effectRef idx="0">
+            <a:schemeClr val="accent1"/>
+          </a:effectRef>
+          <a:fontRef idx="minor">
+            <a:schemeClr val="tx1"/>
+          </a:fontRef>
+        </p:style>
+      </p:cxnSp>
     </p:spTree>
     <p:extLst>
       <p:ext uri="{BB962C8B-B14F-4D97-AF65-F5344CB8AC3E}">

</xml_diff>